<commit_message>
Add wifi direct slide to ppt
</commit_message>
<xml_diff>
--- a/EndPresSlides.pptx
+++ b/EndPresSlides.pptx
@@ -4,15 +4,19 @@
   <p:sldMasterIdLst>
     <p:sldMasterId id="2147483648" r:id="rId1"/>
   </p:sldMasterIdLst>
+  <p:notesMasterIdLst>
+    <p:notesMasterId r:id="rId11"/>
+  </p:notesMasterIdLst>
   <p:sldIdLst>
     <p:sldId id="269" r:id="rId2"/>
     <p:sldId id="270" r:id="rId3"/>
     <p:sldId id="273" r:id="rId4"/>
-    <p:sldId id="274" r:id="rId5"/>
-    <p:sldId id="275" r:id="rId6"/>
-    <p:sldId id="272" r:id="rId7"/>
-    <p:sldId id="276" r:id="rId8"/>
-    <p:sldId id="277" r:id="rId9"/>
+    <p:sldId id="278" r:id="rId5"/>
+    <p:sldId id="274" r:id="rId6"/>
+    <p:sldId id="275" r:id="rId7"/>
+    <p:sldId id="272" r:id="rId8"/>
+    <p:sldId id="276" r:id="rId9"/>
+    <p:sldId id="277" r:id="rId10"/>
   </p:sldIdLst>
   <p:sldSz cx="9144000" cy="6858000" type="screen4x3"/>
   <p:notesSz cx="7010400" cy="9296400"/>
@@ -141,7 +145,646 @@
       </a:defRPr>
     </a:lvl9pPr>
   </p:defaultTextStyle>
+  <p:extLst>
+    <p:ext uri="{EFAFB233-063F-42B5-8137-9DF3F51BA10A}">
+      <p15:sldGuideLst xmlns:p15="http://schemas.microsoft.com/office/powerpoint/2012/main">
+        <p15:guide id="1" orient="horz" pos="2160">
+          <p15:clr>
+            <a:srgbClr val="A4A3A4"/>
+          </p15:clr>
+        </p15:guide>
+        <p15:guide id="2" pos="2880">
+          <p15:clr>
+            <a:srgbClr val="A4A3A4"/>
+          </p15:clr>
+        </p15:guide>
+      </p15:sldGuideLst>
+    </p:ext>
+  </p:extLst>
 </p:presentation>
+</file>
+
+<file path=ppt/notesMasters/notesMaster1.xml><?xml version="1.0" encoding="utf-8"?>
+<p:notesMaster xmlns:a="http://schemas.openxmlformats.org/drawingml/2006/main" xmlns:r="http://schemas.openxmlformats.org/officeDocument/2006/relationships" xmlns:p="http://schemas.openxmlformats.org/presentationml/2006/main">
+  <p:cSld>
+    <p:bg>
+      <p:bgRef idx="1001">
+        <a:schemeClr val="bg1"/>
+      </p:bgRef>
+    </p:bg>
+    <p:spTree>
+      <p:nvGrpSpPr>
+        <p:cNvPr id="1" name=""/>
+        <p:cNvGrpSpPr/>
+        <p:nvPr/>
+      </p:nvGrpSpPr>
+      <p:grpSpPr>
+        <a:xfrm>
+          <a:off x="0" y="0"/>
+          <a:ext cx="0" cy="0"/>
+          <a:chOff x="0" y="0"/>
+          <a:chExt cx="0" cy="0"/>
+        </a:xfrm>
+      </p:grpSpPr>
+    </p:spTree>
+    <p:extLst>
+      <p:ext uri="{BB962C8B-B14F-4D97-AF65-F5344CB8AC3E}">
+        <p14:creationId xmlns:p14="http://schemas.microsoft.com/office/powerpoint/2010/main" val="442844242"/>
+      </p:ext>
+    </p:extLst>
+  </p:cSld>
+  <p:clrMap bg1="lt1" tx1="dk1" bg2="lt2" tx2="dk2" accent1="accent1" accent2="accent2" accent3="accent3" accent4="accent4" accent5="accent5" accent6="accent6" hlink="hlink" folHlink="folHlink"/>
+  <p:notesStyle>
+    <a:lvl1pPr marL="0" algn="l" defTabSz="914400" rtl="0" eaLnBrk="1" latinLnBrk="0" hangingPunct="1">
+      <a:defRPr sz="1200" kern="1200">
+        <a:solidFill>
+          <a:schemeClr val="tx1"/>
+        </a:solidFill>
+        <a:latin typeface="+mn-lt"/>
+        <a:ea typeface="+mn-ea"/>
+        <a:cs typeface="+mn-cs"/>
+      </a:defRPr>
+    </a:lvl1pPr>
+    <a:lvl2pPr marL="457200" algn="l" defTabSz="914400" rtl="0" eaLnBrk="1" latinLnBrk="0" hangingPunct="1">
+      <a:defRPr sz="1200" kern="1200">
+        <a:solidFill>
+          <a:schemeClr val="tx1"/>
+        </a:solidFill>
+        <a:latin typeface="+mn-lt"/>
+        <a:ea typeface="+mn-ea"/>
+        <a:cs typeface="+mn-cs"/>
+      </a:defRPr>
+    </a:lvl2pPr>
+    <a:lvl3pPr marL="914400" algn="l" defTabSz="914400" rtl="0" eaLnBrk="1" latinLnBrk="0" hangingPunct="1">
+      <a:defRPr sz="1200" kern="1200">
+        <a:solidFill>
+          <a:schemeClr val="tx1"/>
+        </a:solidFill>
+        <a:latin typeface="+mn-lt"/>
+        <a:ea typeface="+mn-ea"/>
+        <a:cs typeface="+mn-cs"/>
+      </a:defRPr>
+    </a:lvl3pPr>
+    <a:lvl4pPr marL="1371600" algn="l" defTabSz="914400" rtl="0" eaLnBrk="1" latinLnBrk="0" hangingPunct="1">
+      <a:defRPr sz="1200" kern="1200">
+        <a:solidFill>
+          <a:schemeClr val="tx1"/>
+        </a:solidFill>
+        <a:latin typeface="+mn-lt"/>
+        <a:ea typeface="+mn-ea"/>
+        <a:cs typeface="+mn-cs"/>
+      </a:defRPr>
+    </a:lvl4pPr>
+    <a:lvl5pPr marL="1828800" algn="l" defTabSz="914400" rtl="0" eaLnBrk="1" latinLnBrk="0" hangingPunct="1">
+      <a:defRPr sz="1200" kern="1200">
+        <a:solidFill>
+          <a:schemeClr val="tx1"/>
+        </a:solidFill>
+        <a:latin typeface="+mn-lt"/>
+        <a:ea typeface="+mn-ea"/>
+        <a:cs typeface="+mn-cs"/>
+      </a:defRPr>
+    </a:lvl5pPr>
+    <a:lvl6pPr marL="2286000" algn="l" defTabSz="914400" rtl="0" eaLnBrk="1" latinLnBrk="0" hangingPunct="1">
+      <a:defRPr sz="1200" kern="1200">
+        <a:solidFill>
+          <a:schemeClr val="tx1"/>
+        </a:solidFill>
+        <a:latin typeface="+mn-lt"/>
+        <a:ea typeface="+mn-ea"/>
+        <a:cs typeface="+mn-cs"/>
+      </a:defRPr>
+    </a:lvl6pPr>
+    <a:lvl7pPr marL="2743200" algn="l" defTabSz="914400" rtl="0" eaLnBrk="1" latinLnBrk="0" hangingPunct="1">
+      <a:defRPr sz="1200" kern="1200">
+        <a:solidFill>
+          <a:schemeClr val="tx1"/>
+        </a:solidFill>
+        <a:latin typeface="+mn-lt"/>
+        <a:ea typeface="+mn-ea"/>
+        <a:cs typeface="+mn-cs"/>
+      </a:defRPr>
+    </a:lvl7pPr>
+    <a:lvl8pPr marL="3200400" algn="l" defTabSz="914400" rtl="0" eaLnBrk="1" latinLnBrk="0" hangingPunct="1">
+      <a:defRPr sz="1200" kern="1200">
+        <a:solidFill>
+          <a:schemeClr val="tx1"/>
+        </a:solidFill>
+        <a:latin typeface="+mn-lt"/>
+        <a:ea typeface="+mn-ea"/>
+        <a:cs typeface="+mn-cs"/>
+      </a:defRPr>
+    </a:lvl8pPr>
+    <a:lvl9pPr marL="3657600" algn="l" defTabSz="914400" rtl="0" eaLnBrk="1" latinLnBrk="0" hangingPunct="1">
+      <a:defRPr sz="1200" kern="1200">
+        <a:solidFill>
+          <a:schemeClr val="tx1"/>
+        </a:solidFill>
+        <a:latin typeface="+mn-lt"/>
+        <a:ea typeface="+mn-ea"/>
+        <a:cs typeface="+mn-cs"/>
+      </a:defRPr>
+    </a:lvl9pPr>
+  </p:notesStyle>
+</p:notesMaster>
+</file>
+
+<file path=ppt/notesSlides/notesSlide1.xml><?xml version="1.0" encoding="utf-8"?>
+<p:notes xmlns:a="http://schemas.openxmlformats.org/drawingml/2006/main" xmlns:r="http://schemas.openxmlformats.org/officeDocument/2006/relationships" xmlns:p="http://schemas.openxmlformats.org/presentationml/2006/main">
+  <p:cSld>
+    <p:spTree>
+      <p:nvGrpSpPr>
+        <p:cNvPr id="1" name=""/>
+        <p:cNvGrpSpPr/>
+        <p:nvPr/>
+      </p:nvGrpSpPr>
+      <p:grpSpPr>
+        <a:xfrm>
+          <a:off x="0" y="0"/>
+          <a:ext cx="0" cy="0"/>
+          <a:chOff x="0" y="0"/>
+          <a:chExt cx="0" cy="0"/>
+        </a:xfrm>
+      </p:grpSpPr>
+      <p:sp>
+        <p:nvSpPr>
+          <p:cNvPr id="2" name="Slide Image Placeholder 1"/>
+          <p:cNvSpPr>
+            <a:spLocks noGrp="1" noRot="1" noChangeAspect="1"/>
+          </p:cNvSpPr>
+          <p:nvPr>
+            <p:ph type="sldImg"/>
+          </p:nvPr>
+        </p:nvSpPr>
+        <p:spPr>
+          <a:xfrm>
+            <a:off x="1414463" y="1162050"/>
+            <a:ext cx="4181475" cy="3136900"/>
+          </a:xfrm>
+          <a:prstGeom prst="rect">
+            <a:avLst/>
+          </a:prstGeom>
+          <a:noFill/>
+          <a:ln w="12700">
+            <a:solidFill>
+              <a:prstClr val="black"/>
+            </a:solidFill>
+          </a:ln>
+        </p:spPr>
+      </p:sp>
+      <p:sp>
+        <p:nvSpPr>
+          <p:cNvPr id="3" name="Notes Placeholder 2"/>
+          <p:cNvSpPr>
+            <a:spLocks noGrp="1"/>
+          </p:cNvSpPr>
+          <p:nvPr>
+            <p:ph type="body" idx="1"/>
+          </p:nvPr>
+        </p:nvSpPr>
+        <p:spPr>
+          <a:xfrm>
+            <a:off x="701675" y="4473575"/>
+            <a:ext cx="5607050" cy="3660775"/>
+          </a:xfrm>
+          <a:prstGeom prst="rect">
+            <a:avLst/>
+          </a:prstGeom>
+        </p:spPr>
+        <p:txBody>
+          <a:bodyPr/>
+          <a:lstStyle/>
+          <a:p>
+            <a:endParaRPr lang="en-US"/>
+          </a:p>
+        </p:txBody>
+      </p:sp>
+    </p:spTree>
+    <p:extLst>
+      <p:ext uri="{BB962C8B-B14F-4D97-AF65-F5344CB8AC3E}">
+        <p14:creationId xmlns:p14="http://schemas.microsoft.com/office/powerpoint/2010/main" val="2645877359"/>
+      </p:ext>
+    </p:extLst>
+  </p:cSld>
+  <p:clrMapOvr>
+    <a:masterClrMapping/>
+  </p:clrMapOvr>
+</p:notes>
+</file>
+
+<file path=ppt/notesSlides/notesSlide2.xml><?xml version="1.0" encoding="utf-8"?>
+<p:notes xmlns:a="http://schemas.openxmlformats.org/drawingml/2006/main" xmlns:r="http://schemas.openxmlformats.org/officeDocument/2006/relationships" xmlns:p="http://schemas.openxmlformats.org/presentationml/2006/main">
+  <p:cSld>
+    <p:spTree>
+      <p:nvGrpSpPr>
+        <p:cNvPr id="1" name=""/>
+        <p:cNvGrpSpPr/>
+        <p:nvPr/>
+      </p:nvGrpSpPr>
+      <p:grpSpPr>
+        <a:xfrm>
+          <a:off x="0" y="0"/>
+          <a:ext cx="0" cy="0"/>
+          <a:chOff x="0" y="0"/>
+          <a:chExt cx="0" cy="0"/>
+        </a:xfrm>
+      </p:grpSpPr>
+      <p:sp>
+        <p:nvSpPr>
+          <p:cNvPr id="2" name="Slide Image Placeholder 1"/>
+          <p:cNvSpPr>
+            <a:spLocks noGrp="1" noRot="1" noChangeAspect="1"/>
+          </p:cNvSpPr>
+          <p:nvPr>
+            <p:ph type="sldImg"/>
+          </p:nvPr>
+        </p:nvSpPr>
+        <p:spPr>
+          <a:xfrm>
+            <a:off x="1414463" y="1162050"/>
+            <a:ext cx="4181475" cy="3136900"/>
+          </a:xfrm>
+          <a:prstGeom prst="rect">
+            <a:avLst/>
+          </a:prstGeom>
+          <a:noFill/>
+          <a:ln w="12700">
+            <a:solidFill>
+              <a:prstClr val="black"/>
+            </a:solidFill>
+          </a:ln>
+        </p:spPr>
+      </p:sp>
+      <p:sp>
+        <p:nvSpPr>
+          <p:cNvPr id="3" name="Notes Placeholder 2"/>
+          <p:cNvSpPr>
+            <a:spLocks noGrp="1"/>
+          </p:cNvSpPr>
+          <p:nvPr>
+            <p:ph type="body" idx="1"/>
+          </p:nvPr>
+        </p:nvSpPr>
+        <p:spPr>
+          <a:xfrm>
+            <a:off x="701675" y="4473575"/>
+            <a:ext cx="5607050" cy="3660775"/>
+          </a:xfrm>
+          <a:prstGeom prst="rect">
+            <a:avLst/>
+          </a:prstGeom>
+        </p:spPr>
+        <p:txBody>
+          <a:bodyPr/>
+          <a:lstStyle/>
+          <a:p>
+            <a:endParaRPr lang="en-US"/>
+          </a:p>
+        </p:txBody>
+      </p:sp>
+    </p:spTree>
+    <p:extLst>
+      <p:ext uri="{BB962C8B-B14F-4D97-AF65-F5344CB8AC3E}">
+        <p14:creationId xmlns:p14="http://schemas.microsoft.com/office/powerpoint/2010/main" val="1667420339"/>
+      </p:ext>
+    </p:extLst>
+  </p:cSld>
+  <p:clrMapOvr>
+    <a:masterClrMapping/>
+  </p:clrMapOvr>
+</p:notes>
+</file>
+
+<file path=ppt/notesSlides/notesSlide3.xml><?xml version="1.0" encoding="utf-8"?>
+<p:notes xmlns:a="http://schemas.openxmlformats.org/drawingml/2006/main" xmlns:r="http://schemas.openxmlformats.org/officeDocument/2006/relationships" xmlns:p="http://schemas.openxmlformats.org/presentationml/2006/main">
+  <p:cSld>
+    <p:spTree>
+      <p:nvGrpSpPr>
+        <p:cNvPr id="1" name=""/>
+        <p:cNvGrpSpPr/>
+        <p:nvPr/>
+      </p:nvGrpSpPr>
+      <p:grpSpPr>
+        <a:xfrm>
+          <a:off x="0" y="0"/>
+          <a:ext cx="0" cy="0"/>
+          <a:chOff x="0" y="0"/>
+          <a:chExt cx="0" cy="0"/>
+        </a:xfrm>
+      </p:grpSpPr>
+      <p:sp>
+        <p:nvSpPr>
+          <p:cNvPr id="2" name="Slide Image Placeholder 1"/>
+          <p:cNvSpPr>
+            <a:spLocks noGrp="1" noRot="1" noChangeAspect="1"/>
+          </p:cNvSpPr>
+          <p:nvPr>
+            <p:ph type="sldImg"/>
+          </p:nvPr>
+        </p:nvSpPr>
+        <p:spPr>
+          <a:xfrm>
+            <a:off x="1414463" y="1162050"/>
+            <a:ext cx="4181475" cy="3136900"/>
+          </a:xfrm>
+          <a:prstGeom prst="rect">
+            <a:avLst/>
+          </a:prstGeom>
+          <a:noFill/>
+          <a:ln w="12700">
+            <a:solidFill>
+              <a:prstClr val="black"/>
+            </a:solidFill>
+          </a:ln>
+        </p:spPr>
+      </p:sp>
+      <p:sp>
+        <p:nvSpPr>
+          <p:cNvPr id="3" name="Notes Placeholder 2"/>
+          <p:cNvSpPr>
+            <a:spLocks noGrp="1"/>
+          </p:cNvSpPr>
+          <p:nvPr>
+            <p:ph type="body" idx="1"/>
+          </p:nvPr>
+        </p:nvSpPr>
+        <p:spPr>
+          <a:xfrm>
+            <a:off x="701675" y="4473575"/>
+            <a:ext cx="5607050" cy="3660775"/>
+          </a:xfrm>
+          <a:prstGeom prst="rect">
+            <a:avLst/>
+          </a:prstGeom>
+        </p:spPr>
+        <p:txBody>
+          <a:bodyPr/>
+          <a:lstStyle/>
+          <a:p>
+            <a:endParaRPr lang="en-US"/>
+          </a:p>
+        </p:txBody>
+      </p:sp>
+    </p:spTree>
+    <p:extLst>
+      <p:ext uri="{BB962C8B-B14F-4D97-AF65-F5344CB8AC3E}">
+        <p14:creationId xmlns:p14="http://schemas.microsoft.com/office/powerpoint/2010/main" val="1338860435"/>
+      </p:ext>
+    </p:extLst>
+  </p:cSld>
+  <p:clrMapOvr>
+    <a:masterClrMapping/>
+  </p:clrMapOvr>
+</p:notes>
+</file>
+
+<file path=ppt/notesSlides/notesSlide4.xml><?xml version="1.0" encoding="utf-8"?>
+<p:notes xmlns:a="http://schemas.openxmlformats.org/drawingml/2006/main" xmlns:r="http://schemas.openxmlformats.org/officeDocument/2006/relationships" xmlns:p="http://schemas.openxmlformats.org/presentationml/2006/main">
+  <p:cSld>
+    <p:spTree>
+      <p:nvGrpSpPr>
+        <p:cNvPr id="1" name=""/>
+        <p:cNvGrpSpPr/>
+        <p:nvPr/>
+      </p:nvGrpSpPr>
+      <p:grpSpPr>
+        <a:xfrm>
+          <a:off x="0" y="0"/>
+          <a:ext cx="0" cy="0"/>
+          <a:chOff x="0" y="0"/>
+          <a:chExt cx="0" cy="0"/>
+        </a:xfrm>
+      </p:grpSpPr>
+      <p:sp>
+        <p:nvSpPr>
+          <p:cNvPr id="2" name="Slide Image Placeholder 1"/>
+          <p:cNvSpPr>
+            <a:spLocks noGrp="1" noRot="1" noChangeAspect="1"/>
+          </p:cNvSpPr>
+          <p:nvPr>
+            <p:ph type="sldImg"/>
+          </p:nvPr>
+        </p:nvSpPr>
+        <p:spPr>
+          <a:xfrm>
+            <a:off x="1414463" y="1162050"/>
+            <a:ext cx="4181475" cy="3136900"/>
+          </a:xfrm>
+          <a:prstGeom prst="rect">
+            <a:avLst/>
+          </a:prstGeom>
+          <a:noFill/>
+          <a:ln w="12700">
+            <a:solidFill>
+              <a:prstClr val="black"/>
+            </a:solidFill>
+          </a:ln>
+        </p:spPr>
+      </p:sp>
+      <p:sp>
+        <p:nvSpPr>
+          <p:cNvPr id="3" name="Notes Placeholder 2"/>
+          <p:cNvSpPr>
+            <a:spLocks noGrp="1"/>
+          </p:cNvSpPr>
+          <p:nvPr>
+            <p:ph type="body" idx="1"/>
+          </p:nvPr>
+        </p:nvSpPr>
+        <p:spPr>
+          <a:xfrm>
+            <a:off x="701675" y="4473575"/>
+            <a:ext cx="5607050" cy="3660775"/>
+          </a:xfrm>
+          <a:prstGeom prst="rect">
+            <a:avLst/>
+          </a:prstGeom>
+        </p:spPr>
+        <p:txBody>
+          <a:bodyPr/>
+          <a:lstStyle/>
+          <a:p>
+            <a:endParaRPr lang="en-US"/>
+          </a:p>
+        </p:txBody>
+      </p:sp>
+    </p:spTree>
+    <p:extLst>
+      <p:ext uri="{BB962C8B-B14F-4D97-AF65-F5344CB8AC3E}">
+        <p14:creationId xmlns:p14="http://schemas.microsoft.com/office/powerpoint/2010/main" val="4076662938"/>
+      </p:ext>
+    </p:extLst>
+  </p:cSld>
+  <p:clrMapOvr>
+    <a:masterClrMapping/>
+  </p:clrMapOvr>
+</p:notes>
+</file>
+
+<file path=ppt/notesSlides/notesSlide5.xml><?xml version="1.0" encoding="utf-8"?>
+<p:notes xmlns:a="http://schemas.openxmlformats.org/drawingml/2006/main" xmlns:r="http://schemas.openxmlformats.org/officeDocument/2006/relationships" xmlns:p="http://schemas.openxmlformats.org/presentationml/2006/main">
+  <p:cSld>
+    <p:spTree>
+      <p:nvGrpSpPr>
+        <p:cNvPr id="1" name=""/>
+        <p:cNvGrpSpPr/>
+        <p:nvPr/>
+      </p:nvGrpSpPr>
+      <p:grpSpPr>
+        <a:xfrm>
+          <a:off x="0" y="0"/>
+          <a:ext cx="0" cy="0"/>
+          <a:chOff x="0" y="0"/>
+          <a:chExt cx="0" cy="0"/>
+        </a:xfrm>
+      </p:grpSpPr>
+      <p:sp>
+        <p:nvSpPr>
+          <p:cNvPr id="2" name="Slide Image Placeholder 1"/>
+          <p:cNvSpPr>
+            <a:spLocks noGrp="1" noRot="1" noChangeAspect="1"/>
+          </p:cNvSpPr>
+          <p:nvPr>
+            <p:ph type="sldImg"/>
+          </p:nvPr>
+        </p:nvSpPr>
+        <p:spPr>
+          <a:xfrm>
+            <a:off x="1414463" y="1162050"/>
+            <a:ext cx="4181475" cy="3136900"/>
+          </a:xfrm>
+          <a:prstGeom prst="rect">
+            <a:avLst/>
+          </a:prstGeom>
+          <a:noFill/>
+          <a:ln w="12700">
+            <a:solidFill>
+              <a:prstClr val="black"/>
+            </a:solidFill>
+          </a:ln>
+        </p:spPr>
+      </p:sp>
+      <p:sp>
+        <p:nvSpPr>
+          <p:cNvPr id="3" name="Notes Placeholder 2"/>
+          <p:cNvSpPr>
+            <a:spLocks noGrp="1"/>
+          </p:cNvSpPr>
+          <p:nvPr>
+            <p:ph type="body" idx="1"/>
+          </p:nvPr>
+        </p:nvSpPr>
+        <p:spPr>
+          <a:xfrm>
+            <a:off x="701675" y="4473575"/>
+            <a:ext cx="5607050" cy="3660775"/>
+          </a:xfrm>
+          <a:prstGeom prst="rect">
+            <a:avLst/>
+          </a:prstGeom>
+        </p:spPr>
+        <p:txBody>
+          <a:bodyPr/>
+          <a:lstStyle/>
+          <a:p>
+            <a:endParaRPr lang="en-US"/>
+          </a:p>
+        </p:txBody>
+      </p:sp>
+    </p:spTree>
+    <p:extLst>
+      <p:ext uri="{BB962C8B-B14F-4D97-AF65-F5344CB8AC3E}">
+        <p14:creationId xmlns:p14="http://schemas.microsoft.com/office/powerpoint/2010/main" val="1592223891"/>
+      </p:ext>
+    </p:extLst>
+  </p:cSld>
+  <p:clrMapOvr>
+    <a:masterClrMapping/>
+  </p:clrMapOvr>
+</p:notes>
+</file>
+
+<file path=ppt/notesSlides/notesSlide6.xml><?xml version="1.0" encoding="utf-8"?>
+<p:notes xmlns:a="http://schemas.openxmlformats.org/drawingml/2006/main" xmlns:r="http://schemas.openxmlformats.org/officeDocument/2006/relationships" xmlns:p="http://schemas.openxmlformats.org/presentationml/2006/main">
+  <p:cSld>
+    <p:spTree>
+      <p:nvGrpSpPr>
+        <p:cNvPr id="1" name=""/>
+        <p:cNvGrpSpPr/>
+        <p:nvPr/>
+      </p:nvGrpSpPr>
+      <p:grpSpPr>
+        <a:xfrm>
+          <a:off x="0" y="0"/>
+          <a:ext cx="0" cy="0"/>
+          <a:chOff x="0" y="0"/>
+          <a:chExt cx="0" cy="0"/>
+        </a:xfrm>
+      </p:grpSpPr>
+      <p:sp>
+        <p:nvSpPr>
+          <p:cNvPr id="2" name="Slide Image Placeholder 1"/>
+          <p:cNvSpPr>
+            <a:spLocks noGrp="1" noRot="1" noChangeAspect="1"/>
+          </p:cNvSpPr>
+          <p:nvPr>
+            <p:ph type="sldImg"/>
+          </p:nvPr>
+        </p:nvSpPr>
+        <p:spPr>
+          <a:xfrm>
+            <a:off x="1414463" y="1162050"/>
+            <a:ext cx="4181475" cy="3136900"/>
+          </a:xfrm>
+          <a:prstGeom prst="rect">
+            <a:avLst/>
+          </a:prstGeom>
+          <a:noFill/>
+          <a:ln w="12700">
+            <a:solidFill>
+              <a:prstClr val="black"/>
+            </a:solidFill>
+          </a:ln>
+        </p:spPr>
+      </p:sp>
+      <p:sp>
+        <p:nvSpPr>
+          <p:cNvPr id="3" name="Notes Placeholder 2"/>
+          <p:cNvSpPr>
+            <a:spLocks noGrp="1"/>
+          </p:cNvSpPr>
+          <p:nvPr>
+            <p:ph type="body" idx="1"/>
+          </p:nvPr>
+        </p:nvSpPr>
+        <p:spPr>
+          <a:xfrm>
+            <a:off x="701675" y="4473575"/>
+            <a:ext cx="5607050" cy="3660775"/>
+          </a:xfrm>
+          <a:prstGeom prst="rect">
+            <a:avLst/>
+          </a:prstGeom>
+        </p:spPr>
+        <p:txBody>
+          <a:bodyPr/>
+          <a:lstStyle/>
+          <a:p>
+            <a:endParaRPr lang="en-US"/>
+          </a:p>
+        </p:txBody>
+      </p:sp>
+    </p:spTree>
+    <p:extLst>
+      <p:ext uri="{BB962C8B-B14F-4D97-AF65-F5344CB8AC3E}">
+        <p14:creationId xmlns:p14="http://schemas.microsoft.com/office/powerpoint/2010/main" val="3220321115"/>
+      </p:ext>
+    </p:extLst>
+  </p:cSld>
+  <p:clrMapOvr>
+    <a:masterClrMapping/>
+  </p:clrMapOvr>
+</p:notes>
 </file>
 
 <file path=ppt/slideLayouts/slideLayout1.xml><?xml version="1.0" encoding="utf-8"?>
@@ -335,7 +978,7 @@
               <a:pPr>
                 <a:defRPr/>
               </a:pPr>
-              <a:t>12/2/2013</a:t>
+              <a:t>12/3/2013</a:t>
             </a:fld>
             <a:endParaRPr lang="en-US" dirty="0"/>
           </a:p>
@@ -527,7 +1170,7 @@
               <a:pPr>
                 <a:defRPr/>
               </a:pPr>
-              <a:t>12/2/2013</a:t>
+              <a:t>12/3/2013</a:t>
             </a:fld>
             <a:endParaRPr lang="en-US" dirty="0"/>
           </a:p>
@@ -729,7 +1372,7 @@
               <a:pPr>
                 <a:defRPr/>
               </a:pPr>
-              <a:t>12/2/2013</a:t>
+              <a:t>12/3/2013</a:t>
             </a:fld>
             <a:endParaRPr lang="en-US" dirty="0"/>
           </a:p>
@@ -921,7 +1564,7 @@
               <a:pPr>
                 <a:defRPr/>
               </a:pPr>
-              <a:t>12/2/2013</a:t>
+              <a:t>12/3/2013</a:t>
             </a:fld>
             <a:endParaRPr lang="en-US" dirty="0"/>
           </a:p>
@@ -1189,7 +1832,7 @@
               <a:pPr>
                 <a:defRPr/>
               </a:pPr>
-              <a:t>12/2/2013</a:t>
+              <a:t>12/3/2013</a:t>
             </a:fld>
             <a:endParaRPr lang="en-US" dirty="0"/>
           </a:p>
@@ -1499,7 +2142,7 @@
               <a:pPr>
                 <a:defRPr/>
               </a:pPr>
-              <a:t>12/2/2013</a:t>
+              <a:t>12/3/2013</a:t>
             </a:fld>
             <a:endParaRPr lang="en-US" dirty="0"/>
           </a:p>
@@ -1943,7 +2586,7 @@
               <a:pPr>
                 <a:defRPr/>
               </a:pPr>
-              <a:t>12/2/2013</a:t>
+              <a:t>12/3/2013</a:t>
             </a:fld>
             <a:endParaRPr lang="en-US" dirty="0"/>
           </a:p>
@@ -2083,7 +2726,7 @@
               <a:pPr>
                 <a:defRPr/>
               </a:pPr>
-              <a:t>12/2/2013</a:t>
+              <a:t>12/3/2013</a:t>
             </a:fld>
             <a:endParaRPr lang="en-US" dirty="0"/>
           </a:p>
@@ -2200,7 +2843,7 @@
               <a:pPr>
                 <a:defRPr/>
               </a:pPr>
-              <a:t>12/2/2013</a:t>
+              <a:t>12/3/2013</a:t>
             </a:fld>
             <a:endParaRPr lang="en-US" dirty="0"/>
           </a:p>
@@ -2499,7 +3142,7 @@
               <a:pPr>
                 <a:defRPr/>
               </a:pPr>
-              <a:t>12/2/2013</a:t>
+              <a:t>12/3/2013</a:t>
             </a:fld>
             <a:endParaRPr lang="en-US" dirty="0"/>
           </a:p>
@@ -2777,7 +3420,7 @@
               <a:pPr>
                 <a:defRPr/>
               </a:pPr>
-              <a:t>12/2/2013</a:t>
+              <a:t>12/3/2013</a:t>
             </a:fld>
             <a:endParaRPr lang="en-US" dirty="0"/>
           </a:p>
@@ -3033,7 +3676,7 @@
               <a:pPr>
                 <a:defRPr/>
               </a:pPr>
-              <a:t>12/2/2013</a:t>
+              <a:t>12/3/2013</a:t>
             </a:fld>
             <a:endParaRPr lang="en-US" dirty="0"/>
           </a:p>
@@ -3890,7 +4533,7 @@
           <p:nvPr/>
         </p:nvPicPr>
         <p:blipFill>
-          <a:blip r:embed="rId2"/>
+          <a:blip r:embed="rId3"/>
           <a:srcRect/>
           <a:stretch>
             <a:fillRect/>
@@ -3922,7 +4565,7 @@
           <p:nvPr/>
         </p:nvPicPr>
         <p:blipFill>
-          <a:blip r:embed="rId3"/>
+          <a:blip r:embed="rId4"/>
           <a:srcRect/>
           <a:stretch>
             <a:fillRect/>
@@ -3954,7 +4597,7 @@
           <p:nvPr/>
         </p:nvPicPr>
         <p:blipFill>
-          <a:blip r:embed="rId4"/>
+          <a:blip r:embed="rId5"/>
           <a:srcRect/>
           <a:stretch>
             <a:fillRect/>
@@ -4391,7 +5034,7 @@
           <p:nvPr/>
         </p:nvPicPr>
         <p:blipFill>
-          <a:blip r:embed="rId2"/>
+          <a:blip r:embed="rId3"/>
           <a:srcRect/>
           <a:stretch>
             <a:fillRect/>
@@ -4423,7 +5066,7 @@
           <p:nvPr/>
         </p:nvPicPr>
         <p:blipFill>
-          <a:blip r:embed="rId3"/>
+          <a:blip r:embed="rId4"/>
           <a:srcRect/>
           <a:stretch>
             <a:fillRect/>
@@ -4480,7 +5123,7 @@
       </p:grpSpPr>
       <p:sp>
         <p:nvSpPr>
-          <p:cNvPr id="15361" name="Title 1"/>
+          <p:cNvPr id="14337" name="Title 1"/>
           <p:cNvSpPr>
             <a:spLocks noGrp="1"/>
           </p:cNvSpPr>
@@ -4494,18 +5137,18 @@
           <a:lstStyle/>
           <a:p>
             <a:r>
-              <a:rPr lang="en-US" altLang="ja-JP" smtClean="0">
+              <a:rPr lang="en-US" altLang="ja-JP">
                 <a:latin typeface="Arial" charset="0"/>
                 <a:cs typeface="Tahoma" pitchFamily="34" charset="0"/>
               </a:rPr>
-              <a:t>Accomplishments</a:t>
-            </a:r>
-          </a:p>
-        </p:txBody>
-      </p:sp>
-      <p:sp>
-        <p:nvSpPr>
-          <p:cNvPr id="15362" name="Content Placeholder 3"/>
+              <a:t>What is WiFi Direct?</a:t>
+            </a:r>
+          </a:p>
+        </p:txBody>
+      </p:sp>
+      <p:sp>
+        <p:nvSpPr>
+          <p:cNvPr id="14338" name="Content Placeholder 3"/>
           <p:cNvSpPr>
             <a:spLocks noGrp="1"/>
           </p:cNvSpPr>
@@ -4529,11 +5172,11 @@
               <a:buChar char="l"/>
             </a:pPr>
             <a:r>
-              <a:rPr lang="en-US" altLang="ja-JP" smtClean="0">
+              <a:rPr lang="en-US" altLang="ja-JP">
                 <a:latin typeface="Arial" charset="0"/>
-                <a:cs typeface="Tahoma" pitchFamily="34" charset="0"/>
+                <a:cs typeface="Arial"/>
               </a:rPr>
-              <a:t> Utilize the Android WiFi direct communication protocol</a:t>
+              <a:t>Wireless networks without a router</a:t>
             </a:r>
           </a:p>
           <a:p>
@@ -4543,11 +5186,11 @@
               <a:buChar char="l"/>
             </a:pPr>
             <a:r>
-              <a:rPr lang="en-US" altLang="ja-JP" smtClean="0">
+              <a:rPr lang="en-US" altLang="ja-JP">
                 <a:latin typeface="Arial" charset="0"/>
-                <a:cs typeface="Tahoma" pitchFamily="34" charset="0"/>
+                <a:cs typeface="Arial"/>
               </a:rPr>
-              <a:t> Send chat data over WiFi</a:t>
+              <a:t>One of the devices acts as the group owner</a:t>
             </a:r>
           </a:p>
           <a:p>
@@ -4557,37 +5200,12 @@
               <a:buChar char="l"/>
             </a:pPr>
             <a:r>
-              <a:rPr lang="en-US" altLang="ja-JP" smtClean="0">
+              <a:rPr lang="en-US" altLang="ja-JP">
                 <a:latin typeface="Arial" charset="0"/>
-                <a:cs typeface="Tahoma" pitchFamily="34" charset="0"/>
+                <a:cs typeface="Arial"/>
               </a:rPr>
-              <a:t> Discover nearby chat rooms</a:t>
-            </a:r>
-          </a:p>
-          <a:p>
-            <a:pPr marL="0" indent="0">
-              <a:buSzPct val="55000"/>
-              <a:buFont typeface="Wingdings" pitchFamily="2" charset="2"/>
-              <a:buChar char="l"/>
-            </a:pPr>
-            <a:r>
-              <a:rPr lang="en-US" altLang="ja-JP" smtClean="0">
-                <a:latin typeface="Arial" charset="0"/>
-                <a:cs typeface="Tahoma" pitchFamily="34" charset="0"/>
-              </a:rPr>
-              <a:t> Create and leave rooms</a:t>
-            </a:r>
-          </a:p>
-          <a:p>
-            <a:pPr marL="0" indent="0">
-              <a:buSzPct val="55000"/>
-              <a:buFont typeface="Wingdings" pitchFamily="2" charset="2"/>
-              <a:buChar char="l"/>
-            </a:pPr>
-            <a:endParaRPr lang="en-US" altLang="ja-JP" smtClean="0">
-              <a:latin typeface="Arial" charset="0"/>
-              <a:cs typeface="Tahoma" pitchFamily="34" charset="0"/>
-            </a:endParaRPr>
+              <a:t>No SSID, no passphrase</a:t>
+            </a:r>
           </a:p>
         </p:txBody>
       </p:sp>
@@ -4659,39 +5277,7 @@
       </p:sp>
       <p:pic>
         <p:nvPicPr>
-          <p:cNvPr id="15364" name="Picture 11" descr="C:\Users\ccsloan\Dropbox\Senior Design\Presentations\Partner Day 2\UCSC logo (Transparent).tif"/>
-          <p:cNvPicPr>
-            <a:picLocks noChangeAspect="1" noChangeArrowheads="1"/>
-          </p:cNvPicPr>
-          <p:nvPr/>
-        </p:nvPicPr>
-        <p:blipFill>
-          <a:blip r:embed="rId2"/>
-          <a:srcRect/>
-          <a:stretch>
-            <a:fillRect/>
-          </a:stretch>
-        </p:blipFill>
-        <p:spPr bwMode="auto">
-          <a:xfrm>
-            <a:off x="457200" y="5516563"/>
-            <a:ext cx="2551113" cy="731837"/>
-          </a:xfrm>
-          <a:prstGeom prst="rect">
-            <a:avLst/>
-          </a:prstGeom>
-          <a:noFill/>
-          <a:ln w="9525">
-            <a:noFill/>
-            <a:miter lim="800000"/>
-            <a:headEnd/>
-            <a:tailEnd/>
-          </a:ln>
-        </p:spPr>
-      </p:pic>
-      <p:pic>
-        <p:nvPicPr>
-          <p:cNvPr id="15365" name="Picture 13" descr="Icon1"/>
+          <p:cNvPr id="14340" name="Picture 11" descr="C:\Users\ccsloan\Dropbox\Senior Design\Presentations\Partner Day 2\UCSC logo (Transparent).tif"/>
           <p:cNvPicPr>
             <a:picLocks noChangeAspect="1" noChangeArrowheads="1"/>
           </p:cNvPicPr>
@@ -4706,8 +5292,8 @@
         </p:blipFill>
         <p:spPr bwMode="auto">
           <a:xfrm>
-            <a:off x="6096000" y="4953000"/>
-            <a:ext cx="2552700" cy="1428750"/>
+            <a:off x="457200" y="5516563"/>
+            <a:ext cx="2551113" cy="731837"/>
           </a:xfrm>
           <a:prstGeom prst="rect">
             <a:avLst/>
@@ -4721,7 +5307,68 @@
           </a:ln>
         </p:spPr>
       </p:pic>
+      <p:pic>
+        <p:nvPicPr>
+          <p:cNvPr id="14341" name="Picture 13" descr="Icon1"/>
+          <p:cNvPicPr>
+            <a:picLocks noChangeAspect="1" noChangeArrowheads="1"/>
+          </p:cNvPicPr>
+          <p:nvPr/>
+        </p:nvPicPr>
+        <p:blipFill>
+          <a:blip r:embed="rId4"/>
+          <a:srcRect/>
+          <a:stretch>
+            <a:fillRect/>
+          </a:stretch>
+        </p:blipFill>
+        <p:spPr bwMode="auto">
+          <a:xfrm>
+            <a:off x="6096000" y="4953000"/>
+            <a:ext cx="2552700" cy="1428750"/>
+          </a:xfrm>
+          <a:prstGeom prst="rect">
+            <a:avLst/>
+          </a:prstGeom>
+          <a:noFill/>
+          <a:ln w="9525">
+            <a:noFill/>
+            <a:miter lim="800000"/>
+            <a:headEnd/>
+            <a:tailEnd/>
+          </a:ln>
+        </p:spPr>
+      </p:pic>
+      <p:pic>
+        <p:nvPicPr>
+          <p:cNvPr id="2" name="Picture 1"/>
+          <p:cNvPicPr>
+            <a:picLocks noChangeAspect="1"/>
+          </p:cNvPicPr>
+          <p:nvPr/>
+        </p:nvPicPr>
+        <p:blipFill>
+          <a:blip r:embed="rId5"/>
+          <a:stretch>
+            <a:fillRect/>
+          </a:stretch>
+        </p:blipFill>
+        <p:spPr>
+          <a:xfrm>
+            <a:off x="3651860" y="3176588"/>
+            <a:ext cx="3995128" cy="2139633"/>
+          </a:xfrm>
+          <a:prstGeom prst="rect">
+            <a:avLst/>
+          </a:prstGeom>
+        </p:spPr>
+      </p:pic>
     </p:spTree>
+    <p:extLst>
+      <p:ext uri="{BB962C8B-B14F-4D97-AF65-F5344CB8AC3E}">
+        <p14:creationId xmlns:p14="http://schemas.microsoft.com/office/powerpoint/2010/main" val="3340858336"/>
+      </p:ext>
+    </p:extLst>
   </p:cSld>
   <p:clrMapOvr>
     <a:masterClrMapping/>
@@ -4755,7 +5402,7 @@
       </p:grpSpPr>
       <p:sp>
         <p:nvSpPr>
-          <p:cNvPr id="19458" name="Title 1"/>
+          <p:cNvPr id="15361" name="Title 1"/>
           <p:cNvSpPr>
             <a:spLocks noGrp="1"/>
           </p:cNvSpPr>
@@ -4773,14 +5420,14 @@
                 <a:latin typeface="Arial" charset="0"/>
                 <a:cs typeface="Tahoma" pitchFamily="34" charset="0"/>
               </a:rPr>
-              <a:t>Setbacks</a:t>
-            </a:r>
-          </a:p>
-        </p:txBody>
-      </p:sp>
-      <p:sp>
-        <p:nvSpPr>
-          <p:cNvPr id="19459" name="Content Placeholder 3"/>
+              <a:t>Accomplishments</a:t>
+            </a:r>
+          </a:p>
+        </p:txBody>
+      </p:sp>
+      <p:sp>
+        <p:nvSpPr>
+          <p:cNvPr id="15362" name="Content Placeholder 3"/>
           <p:cNvSpPr>
             <a:spLocks noGrp="1"/>
           </p:cNvSpPr>
@@ -4790,7 +5437,7 @@
         </p:nvSpPr>
         <p:spPr>
           <a:xfrm>
-            <a:off x="457200" y="1371600"/>
+            <a:off x="457200" y="1600200"/>
             <a:ext cx="8229600" cy="2362200"/>
           </a:xfrm>
         </p:spPr>
@@ -4808,7 +5455,7 @@
                 <a:latin typeface="Arial" charset="0"/>
                 <a:cs typeface="Tahoma" pitchFamily="34" charset="0"/>
               </a:rPr>
-              <a:t> Regular access to sufficient development devices</a:t>
+              <a:t> Utilize the Android WiFi direct communication protocol</a:t>
             </a:r>
           </a:p>
           <a:p>
@@ -4822,7 +5469,7 @@
                 <a:latin typeface="Arial" charset="0"/>
                 <a:cs typeface="Tahoma" pitchFamily="34" charset="0"/>
               </a:rPr>
-              <a:t> Majority of team new to Android development</a:t>
+              <a:t> Send chat data over WiFi</a:t>
             </a:r>
           </a:p>
           <a:p>
@@ -4836,8 +5483,33 @@
                 <a:latin typeface="Arial" charset="0"/>
                 <a:cs typeface="Tahoma" pitchFamily="34" charset="0"/>
               </a:rPr>
-              <a:t> Under estimated the difficulty and amount of time required to develop basic functionality</a:t>
-            </a:r>
+              <a:t> Discover nearby chat rooms</a:t>
+            </a:r>
+          </a:p>
+          <a:p>
+            <a:pPr marL="0" indent="0">
+              <a:buSzPct val="55000"/>
+              <a:buFont typeface="Wingdings" pitchFamily="2" charset="2"/>
+              <a:buChar char="l"/>
+            </a:pPr>
+            <a:r>
+              <a:rPr lang="en-US" altLang="ja-JP" smtClean="0">
+                <a:latin typeface="Arial" charset="0"/>
+                <a:cs typeface="Tahoma" pitchFamily="34" charset="0"/>
+              </a:rPr>
+              <a:t> Create and leave rooms</a:t>
+            </a:r>
+          </a:p>
+          <a:p>
+            <a:pPr marL="0" indent="0">
+              <a:buSzPct val="55000"/>
+              <a:buFont typeface="Wingdings" pitchFamily="2" charset="2"/>
+              <a:buChar char="l"/>
+            </a:pPr>
+            <a:endParaRPr lang="en-US" altLang="ja-JP" smtClean="0">
+              <a:latin typeface="Arial" charset="0"/>
+              <a:cs typeface="Tahoma" pitchFamily="34" charset="0"/>
+            </a:endParaRPr>
           </a:p>
         </p:txBody>
       </p:sp>
@@ -4909,14 +5581,14 @@
       </p:sp>
       <p:pic>
         <p:nvPicPr>
-          <p:cNvPr id="19461" name="Picture 11" descr="C:\Users\ccsloan\Dropbox\Senior Design\Presentations\Partner Day 2\UCSC logo (Transparent).tif"/>
+          <p:cNvPr id="15364" name="Picture 11" descr="C:\Users\ccsloan\Dropbox\Senior Design\Presentations\Partner Day 2\UCSC logo (Transparent).tif"/>
           <p:cNvPicPr>
             <a:picLocks noChangeAspect="1" noChangeArrowheads="1"/>
           </p:cNvPicPr>
           <p:nvPr/>
         </p:nvPicPr>
         <p:blipFill>
-          <a:blip r:embed="rId2"/>
+          <a:blip r:embed="rId3"/>
           <a:srcRect/>
           <a:stretch>
             <a:fillRect/>
@@ -4941,14 +5613,14 @@
       </p:pic>
       <p:pic>
         <p:nvPicPr>
-          <p:cNvPr id="19462" name="Picture 13" descr="Icon1"/>
+          <p:cNvPr id="15365" name="Picture 13" descr="Icon1"/>
           <p:cNvPicPr>
             <a:picLocks noChangeAspect="1" noChangeArrowheads="1"/>
           </p:cNvPicPr>
           <p:nvPr/>
         </p:nvPicPr>
         <p:blipFill>
-          <a:blip r:embed="rId3"/>
+          <a:blip r:embed="rId4"/>
           <a:srcRect/>
           <a:stretch>
             <a:fillRect/>
@@ -5005,20 +5677,15 @@
       </p:grpSpPr>
       <p:sp>
         <p:nvSpPr>
-          <p:cNvPr id="16385" name="Title 1"/>
-          <p:cNvSpPr>
-            <a:spLocks noGrp="1"/>
-          </p:cNvSpPr>
-          <p:nvPr>
-            <p:ph type="title"/>
-          </p:nvPr>
-        </p:nvSpPr>
-        <p:spPr>
-          <a:xfrm>
-            <a:off x="457200" y="304800"/>
-            <a:ext cx="8229600" cy="1143000"/>
-          </a:xfrm>
-        </p:spPr>
+          <p:cNvPr id="19458" name="Title 1"/>
+          <p:cNvSpPr>
+            <a:spLocks noGrp="1"/>
+          </p:cNvSpPr>
+          <p:nvPr>
+            <p:ph type="title" idx="4294967295"/>
+          </p:nvPr>
+        </p:nvSpPr>
+        <p:spPr/>
         <p:txBody>
           <a:bodyPr/>
           <a:lstStyle/>
@@ -5028,24 +5695,24 @@
                 <a:latin typeface="Arial" charset="0"/>
                 <a:cs typeface="Tahoma" pitchFamily="34" charset="0"/>
               </a:rPr>
-              <a:t>User Stories</a:t>
-            </a:r>
-          </a:p>
-        </p:txBody>
-      </p:sp>
-      <p:sp>
-        <p:nvSpPr>
-          <p:cNvPr id="16386" name="Content Placeholder 3"/>
-          <p:cNvSpPr>
-            <a:spLocks noGrp="1"/>
-          </p:cNvSpPr>
-          <p:nvPr>
-            <p:ph idx="1"/>
+              <a:t>Setbacks</a:t>
+            </a:r>
+          </a:p>
+        </p:txBody>
+      </p:sp>
+      <p:sp>
+        <p:nvSpPr>
+          <p:cNvPr id="19459" name="Content Placeholder 3"/>
+          <p:cNvSpPr>
+            <a:spLocks noGrp="1"/>
+          </p:cNvSpPr>
+          <p:nvPr>
+            <p:ph idx="4294967295"/>
           </p:nvPr>
         </p:nvSpPr>
         <p:spPr>
           <a:xfrm>
-            <a:off x="457200" y="1600200"/>
+            <a:off x="457200" y="1371600"/>
             <a:ext cx="8229600" cy="2362200"/>
           </a:xfrm>
         </p:spPr>
@@ -5053,52 +5720,39 @@
           <a:bodyPr/>
           <a:lstStyle/>
           <a:p>
-            <a:pPr marL="0" indent="0" eaLnBrk="1" hangingPunct="1">
-              <a:spcBef>
-                <a:spcPct val="0"/>
-              </a:spcBef>
+            <a:pPr marL="0" indent="0">
               <a:buSzPct val="55000"/>
               <a:buFont typeface="Wingdings" pitchFamily="2" charset="2"/>
               <a:buChar char="l"/>
             </a:pPr>
             <a:r>
-              <a:rPr lang="en-US" altLang="en-US" smtClean="0">
+              <a:rPr lang="en-US" altLang="ja-JP">
                 <a:latin typeface="Arial" charset="0"/>
-                <a:cs typeface="Times New Roman" pitchFamily="18" charset="0"/>
+                <a:cs typeface="Arial"/>
               </a:rPr>
-              <a:t> As a developer I want functioning netcode so that we can connect multiple phones together.</a:t>
-            </a:r>
-          </a:p>
-          <a:p>
-            <a:pPr marL="0" indent="0" eaLnBrk="1" hangingPunct="1">
-              <a:spcBef>
-                <a:spcPct val="0"/>
-              </a:spcBef>
+              <a:t> </a:t>
+            </a:r>
+            <a:r>
+              <a:rPr lang="en-US" altLang="ja-JP">
+                <a:latin typeface="Arial" charset="0"/>
+                <a:cs typeface="Tahoma" pitchFamily="34" charset="0"/>
+              </a:rPr>
+              <a:t> Regular access to sufficient development devices</a:t>
+            </a:r>
+          </a:p>
+          <a:p>
+            <a:pPr marL="0" indent="0">
               <a:buSzPct val="55000"/>
               <a:buFont typeface="Wingdings" pitchFamily="2" charset="2"/>
               <a:buChar char="l"/>
             </a:pPr>
             <a:r>
-              <a:rPr lang="en-US" altLang="ja-JP" smtClean="0">
+              <a:rPr lang="en-US" altLang="ja-JP">
                 <a:latin typeface="Arial" charset="0"/>
                 <a:cs typeface="Tahoma" pitchFamily="34" charset="0"/>
               </a:rPr>
-              <a:t> As a user, I want to be able to send messages to other users so I can chat with them.</a:t>
-            </a:r>
-          </a:p>
-          <a:p>
-            <a:pPr marL="0" indent="0" eaLnBrk="1" hangingPunct="1">
-              <a:spcBef>
-                <a:spcPct val="0"/>
-              </a:spcBef>
-              <a:buSzPct val="55000"/>
-              <a:buFont typeface="Wingdings" pitchFamily="2" charset="2"/>
-              <a:buChar char="l"/>
-            </a:pPr>
-            <a:endParaRPr lang="en-US" altLang="ja-JP" smtClean="0">
-              <a:latin typeface="Arial" charset="0"/>
-              <a:cs typeface="Times New Roman" pitchFamily="18" charset="0"/>
-            </a:endParaRPr>
+              <a:t> Majority of team new to Android developmen Underestimated ed the difficulty and amount of time required to develop basic functionality</a:t>
+            </a:r>
           </a:p>
         </p:txBody>
       </p:sp>
@@ -5170,14 +5824,14 @@
       </p:sp>
       <p:pic>
         <p:nvPicPr>
-          <p:cNvPr id="16388" name="Picture 11" descr="C:\Users\ccsloan\Dropbox\Senior Design\Presentations\Partner Day 2\UCSC logo (Transparent).tif"/>
+          <p:cNvPr id="19461" name="Picture 11" descr="C:\Users\ccsloan\Dropbox\Senior Design\Presentations\Partner Day 2\UCSC logo (Transparent).tif"/>
           <p:cNvPicPr>
             <a:picLocks noChangeAspect="1" noChangeArrowheads="1"/>
           </p:cNvPicPr>
           <p:nvPr/>
         </p:nvPicPr>
         <p:blipFill>
-          <a:blip r:embed="rId2"/>
+          <a:blip r:embed="rId3"/>
           <a:srcRect/>
           <a:stretch>
             <a:fillRect/>
@@ -5202,14 +5856,14 @@
       </p:pic>
       <p:pic>
         <p:nvPicPr>
-          <p:cNvPr id="16389" name="Picture 13" descr="Icon1"/>
+          <p:cNvPr id="19462" name="Picture 13" descr="Icon1"/>
           <p:cNvPicPr>
             <a:picLocks noChangeAspect="1" noChangeArrowheads="1"/>
           </p:cNvPicPr>
           <p:nvPr/>
         </p:nvPicPr>
         <p:blipFill>
-          <a:blip r:embed="rId3"/>
+          <a:blip r:embed="rId4"/>
           <a:srcRect/>
           <a:stretch>
             <a:fillRect/>
@@ -5266,12 +5920,12 @@
       </p:grpSpPr>
       <p:sp>
         <p:nvSpPr>
-          <p:cNvPr id="21506" name="Title 1"/>
-          <p:cNvSpPr>
-            <a:spLocks noGrp="1"/>
-          </p:cNvSpPr>
-          <p:nvPr>
-            <p:ph type="title" idx="4294967295"/>
+          <p:cNvPr id="16385" name="Title 1"/>
+          <p:cNvSpPr>
+            <a:spLocks noGrp="1"/>
+          </p:cNvSpPr>
+          <p:nvPr>
+            <p:ph type="title"/>
           </p:nvPr>
         </p:nvSpPr>
         <p:spPr>
@@ -5289,25 +5943,25 @@
                 <a:latin typeface="Arial" charset="0"/>
                 <a:cs typeface="Tahoma" pitchFamily="34" charset="0"/>
               </a:rPr>
-              <a:t>Demo</a:t>
-            </a:r>
-          </a:p>
-        </p:txBody>
-      </p:sp>
-      <p:sp>
-        <p:nvSpPr>
-          <p:cNvPr id="21507" name="Content Placeholder 3"/>
-          <p:cNvSpPr>
-            <a:spLocks noGrp="1"/>
-          </p:cNvSpPr>
-          <p:nvPr>
-            <p:ph idx="4294967295"/>
+              <a:t>User Stories</a:t>
+            </a:r>
+          </a:p>
+        </p:txBody>
+      </p:sp>
+      <p:sp>
+        <p:nvSpPr>
+          <p:cNvPr id="16386" name="Content Placeholder 3"/>
+          <p:cNvSpPr>
+            <a:spLocks noGrp="1"/>
+          </p:cNvSpPr>
+          <p:nvPr>
+            <p:ph idx="1"/>
           </p:nvPr>
         </p:nvSpPr>
         <p:spPr>
           <a:xfrm>
-            <a:off x="4495800" y="1905000"/>
-            <a:ext cx="4114800" cy="3200400"/>
+            <a:off x="457200" y="1600200"/>
+            <a:ext cx="8229600" cy="2362200"/>
           </a:xfrm>
         </p:spPr>
         <p:txBody>
@@ -5327,7 +5981,7 @@
                 <a:latin typeface="Arial" charset="0"/>
                 <a:cs typeface="Times New Roman" pitchFamily="18" charset="0"/>
               </a:rPr>
-              <a:t> Enable WiFi direct</a:t>
+              <a:t> As a developer I want functioning netcode so that we can connect multiple phones together.</a:t>
             </a:r>
           </a:p>
           <a:p>
@@ -5340,67 +5994,12 @@
               <a:buChar char="l"/>
             </a:pPr>
             <a:r>
-              <a:rPr lang="en-US" altLang="en-US" smtClean="0">
-                <a:latin typeface="Arial" charset="0"/>
-                <a:cs typeface="Times New Roman" pitchFamily="18" charset="0"/>
-              </a:rPr>
-              <a:t> Create group</a:t>
-            </a:r>
-          </a:p>
-          <a:p>
-            <a:pPr marL="0" indent="0" eaLnBrk="1" hangingPunct="1">
-              <a:spcBef>
-                <a:spcPct val="0"/>
-              </a:spcBef>
-              <a:buSzPct val="55000"/>
-              <a:buFont typeface="Wingdings" pitchFamily="2" charset="2"/>
-              <a:buChar char="l"/>
-            </a:pPr>
-            <a:r>
               <a:rPr lang="en-US" altLang="ja-JP" smtClean="0">
                 <a:latin typeface="Arial" charset="0"/>
-                <a:cs typeface="Times New Roman" pitchFamily="18" charset="0"/>
+                <a:cs typeface="Tahoma" pitchFamily="34" charset="0"/>
               </a:rPr>
-              <a:t> Discover group</a:t>
-            </a:r>
-          </a:p>
-          <a:p>
-            <a:pPr marL="0" indent="0" eaLnBrk="1" hangingPunct="1">
-              <a:spcBef>
-                <a:spcPct val="0"/>
-              </a:spcBef>
-              <a:buSzPct val="55000"/>
-              <a:buFont typeface="Wingdings" pitchFamily="2" charset="2"/>
-              <a:buChar char="l"/>
-            </a:pPr>
-            <a:r>
-              <a:rPr lang="en-US" altLang="ja-JP" smtClean="0">
-                <a:latin typeface="Arial" charset="0"/>
-                <a:cs typeface="Times New Roman" pitchFamily="18" charset="0"/>
-              </a:rPr>
-              <a:t> Join group</a:t>
-            </a:r>
-          </a:p>
-          <a:p>
-            <a:pPr marL="0" indent="0" eaLnBrk="1" hangingPunct="1">
-              <a:spcBef>
-                <a:spcPct val="0"/>
-              </a:spcBef>
-              <a:buSzPct val="55000"/>
-              <a:buFont typeface="Wingdings" pitchFamily="2" charset="2"/>
-              <a:buChar char="l"/>
-            </a:pPr>
-            <a:r>
-              <a:rPr lang="en-US" altLang="ja-JP" smtClean="0">
-                <a:latin typeface="Arial" charset="0"/>
-                <a:cs typeface="Times New Roman" pitchFamily="18" charset="0"/>
-              </a:rPr>
-              <a:t> Chat</a:t>
-            </a:r>
-            <a:endParaRPr lang="en-US" altLang="ja-JP" smtClean="0">
-              <a:latin typeface="Arial" charset="0"/>
-              <a:cs typeface="Tahoma" pitchFamily="34" charset="0"/>
-            </a:endParaRPr>
+              <a:t> As a user, I want to be able to send messages to other users so I can chat with them.</a:t>
+            </a:r>
           </a:p>
           <a:p>
             <a:pPr marL="0" indent="0" eaLnBrk="1" hangingPunct="1">
@@ -5486,6 +6085,322 @@
       </p:sp>
       <p:pic>
         <p:nvPicPr>
+          <p:cNvPr id="16388" name="Picture 11" descr="C:\Users\ccsloan\Dropbox\Senior Design\Presentations\Partner Day 2\UCSC logo (Transparent).tif"/>
+          <p:cNvPicPr>
+            <a:picLocks noChangeAspect="1" noChangeArrowheads="1"/>
+          </p:cNvPicPr>
+          <p:nvPr/>
+        </p:nvPicPr>
+        <p:blipFill>
+          <a:blip r:embed="rId3"/>
+          <a:srcRect/>
+          <a:stretch>
+            <a:fillRect/>
+          </a:stretch>
+        </p:blipFill>
+        <p:spPr bwMode="auto">
+          <a:xfrm>
+            <a:off x="457200" y="5516563"/>
+            <a:ext cx="2551113" cy="731837"/>
+          </a:xfrm>
+          <a:prstGeom prst="rect">
+            <a:avLst/>
+          </a:prstGeom>
+          <a:noFill/>
+          <a:ln w="9525">
+            <a:noFill/>
+            <a:miter lim="800000"/>
+            <a:headEnd/>
+            <a:tailEnd/>
+          </a:ln>
+        </p:spPr>
+      </p:pic>
+      <p:pic>
+        <p:nvPicPr>
+          <p:cNvPr id="16389" name="Picture 13" descr="Icon1"/>
+          <p:cNvPicPr>
+            <a:picLocks noChangeAspect="1" noChangeArrowheads="1"/>
+          </p:cNvPicPr>
+          <p:nvPr/>
+        </p:nvPicPr>
+        <p:blipFill>
+          <a:blip r:embed="rId4"/>
+          <a:srcRect/>
+          <a:stretch>
+            <a:fillRect/>
+          </a:stretch>
+        </p:blipFill>
+        <p:spPr bwMode="auto">
+          <a:xfrm>
+            <a:off x="6096000" y="4953000"/>
+            <a:ext cx="2552700" cy="1428750"/>
+          </a:xfrm>
+          <a:prstGeom prst="rect">
+            <a:avLst/>
+          </a:prstGeom>
+          <a:noFill/>
+          <a:ln w="9525">
+            <a:noFill/>
+            <a:miter lim="800000"/>
+            <a:headEnd/>
+            <a:tailEnd/>
+          </a:ln>
+        </p:spPr>
+      </p:pic>
+    </p:spTree>
+  </p:cSld>
+  <p:clrMapOvr>
+    <a:masterClrMapping/>
+  </p:clrMapOvr>
+  <p:timing>
+    <p:tnLst>
+      <p:par>
+        <p:cTn id="1" dur="indefinite" restart="never" nodeType="tmRoot"/>
+      </p:par>
+    </p:tnLst>
+  </p:timing>
+</p:sld>
+</file>
+
+<file path=ppt/slides/slide8.xml><?xml version="1.0" encoding="utf-8"?>
+<p:sld xmlns:a="http://schemas.openxmlformats.org/drawingml/2006/main" xmlns:r="http://schemas.openxmlformats.org/officeDocument/2006/relationships" xmlns:p="http://schemas.openxmlformats.org/presentationml/2006/main">
+  <p:cSld>
+    <p:spTree>
+      <p:nvGrpSpPr>
+        <p:cNvPr id="1" name=""/>
+        <p:cNvGrpSpPr/>
+        <p:nvPr/>
+      </p:nvGrpSpPr>
+      <p:grpSpPr>
+        <a:xfrm>
+          <a:off x="0" y="0"/>
+          <a:ext cx="0" cy="0"/>
+          <a:chOff x="0" y="0"/>
+          <a:chExt cx="0" cy="0"/>
+        </a:xfrm>
+      </p:grpSpPr>
+      <p:sp>
+        <p:nvSpPr>
+          <p:cNvPr id="21506" name="Title 1"/>
+          <p:cNvSpPr>
+            <a:spLocks noGrp="1"/>
+          </p:cNvSpPr>
+          <p:nvPr>
+            <p:ph type="title" idx="4294967295"/>
+          </p:nvPr>
+        </p:nvSpPr>
+        <p:spPr>
+          <a:xfrm>
+            <a:off x="457200" y="304800"/>
+            <a:ext cx="8229600" cy="1143000"/>
+          </a:xfrm>
+        </p:spPr>
+        <p:txBody>
+          <a:bodyPr/>
+          <a:lstStyle/>
+          <a:p>
+            <a:r>
+              <a:rPr lang="en-US" altLang="ja-JP" smtClean="0">
+                <a:latin typeface="Arial" charset="0"/>
+                <a:cs typeface="Tahoma" pitchFamily="34" charset="0"/>
+              </a:rPr>
+              <a:t>Demo</a:t>
+            </a:r>
+          </a:p>
+        </p:txBody>
+      </p:sp>
+      <p:sp>
+        <p:nvSpPr>
+          <p:cNvPr id="21507" name="Content Placeholder 3"/>
+          <p:cNvSpPr>
+            <a:spLocks noGrp="1"/>
+          </p:cNvSpPr>
+          <p:nvPr>
+            <p:ph idx="4294967295"/>
+          </p:nvPr>
+        </p:nvSpPr>
+        <p:spPr>
+          <a:xfrm>
+            <a:off x="4495800" y="1905000"/>
+            <a:ext cx="4114800" cy="3200400"/>
+          </a:xfrm>
+        </p:spPr>
+        <p:txBody>
+          <a:bodyPr/>
+          <a:lstStyle/>
+          <a:p>
+            <a:pPr marL="0" indent="0" eaLnBrk="1" hangingPunct="1">
+              <a:spcBef>
+                <a:spcPct val="0"/>
+              </a:spcBef>
+              <a:buSzPct val="55000"/>
+              <a:buFont typeface="Wingdings" pitchFamily="2" charset="2"/>
+              <a:buChar char="l"/>
+            </a:pPr>
+            <a:r>
+              <a:rPr lang="en-US" altLang="en-US" smtClean="0">
+                <a:latin typeface="Arial" charset="0"/>
+                <a:cs typeface="Times New Roman" pitchFamily="18" charset="0"/>
+              </a:rPr>
+              <a:t> Enable WiFi direct</a:t>
+            </a:r>
+          </a:p>
+          <a:p>
+            <a:pPr marL="0" indent="0" eaLnBrk="1" hangingPunct="1">
+              <a:spcBef>
+                <a:spcPct val="0"/>
+              </a:spcBef>
+              <a:buSzPct val="55000"/>
+              <a:buFont typeface="Wingdings" pitchFamily="2" charset="2"/>
+              <a:buChar char="l"/>
+            </a:pPr>
+            <a:r>
+              <a:rPr lang="en-US" altLang="en-US" smtClean="0">
+                <a:latin typeface="Arial" charset="0"/>
+                <a:cs typeface="Times New Roman" pitchFamily="18" charset="0"/>
+              </a:rPr>
+              <a:t> Create group</a:t>
+            </a:r>
+          </a:p>
+          <a:p>
+            <a:pPr marL="0" indent="0" eaLnBrk="1" hangingPunct="1">
+              <a:spcBef>
+                <a:spcPct val="0"/>
+              </a:spcBef>
+              <a:buSzPct val="55000"/>
+              <a:buFont typeface="Wingdings" pitchFamily="2" charset="2"/>
+              <a:buChar char="l"/>
+            </a:pPr>
+            <a:r>
+              <a:rPr lang="en-US" altLang="ja-JP" smtClean="0">
+                <a:latin typeface="Arial" charset="0"/>
+                <a:cs typeface="Times New Roman" pitchFamily="18" charset="0"/>
+              </a:rPr>
+              <a:t> Discover group</a:t>
+            </a:r>
+          </a:p>
+          <a:p>
+            <a:pPr marL="0" indent="0" eaLnBrk="1" hangingPunct="1">
+              <a:spcBef>
+                <a:spcPct val="0"/>
+              </a:spcBef>
+              <a:buSzPct val="55000"/>
+              <a:buFont typeface="Wingdings" pitchFamily="2" charset="2"/>
+              <a:buChar char="l"/>
+            </a:pPr>
+            <a:r>
+              <a:rPr lang="en-US" altLang="ja-JP" smtClean="0">
+                <a:latin typeface="Arial" charset="0"/>
+                <a:cs typeface="Times New Roman" pitchFamily="18" charset="0"/>
+              </a:rPr>
+              <a:t> Join group</a:t>
+            </a:r>
+          </a:p>
+          <a:p>
+            <a:pPr marL="0" indent="0" eaLnBrk="1" hangingPunct="1">
+              <a:spcBef>
+                <a:spcPct val="0"/>
+              </a:spcBef>
+              <a:buSzPct val="55000"/>
+              <a:buFont typeface="Wingdings" pitchFamily="2" charset="2"/>
+              <a:buChar char="l"/>
+            </a:pPr>
+            <a:r>
+              <a:rPr lang="en-US" altLang="ja-JP" smtClean="0">
+                <a:latin typeface="Arial" charset="0"/>
+                <a:cs typeface="Times New Roman" pitchFamily="18" charset="0"/>
+              </a:rPr>
+              <a:t> Chat</a:t>
+            </a:r>
+            <a:endParaRPr lang="en-US" altLang="ja-JP" smtClean="0">
+              <a:latin typeface="Arial" charset="0"/>
+              <a:cs typeface="Tahoma" pitchFamily="34" charset="0"/>
+            </a:endParaRPr>
+          </a:p>
+          <a:p>
+            <a:pPr marL="0" indent="0" eaLnBrk="1" hangingPunct="1">
+              <a:spcBef>
+                <a:spcPct val="0"/>
+              </a:spcBef>
+              <a:buSzPct val="55000"/>
+              <a:buFont typeface="Wingdings" pitchFamily="2" charset="2"/>
+              <a:buChar char="l"/>
+            </a:pPr>
+            <a:endParaRPr lang="en-US" altLang="ja-JP" smtClean="0">
+              <a:latin typeface="Arial" charset="0"/>
+              <a:cs typeface="Times New Roman" pitchFamily="18" charset="0"/>
+            </a:endParaRPr>
+          </a:p>
+        </p:txBody>
+      </p:sp>
+      <p:sp>
+        <p:nvSpPr>
+          <p:cNvPr id="8" name="Rectangle 7"/>
+          <p:cNvSpPr/>
+          <p:nvPr/>
+        </p:nvSpPr>
+        <p:spPr>
+          <a:xfrm>
+            <a:off x="0" y="6400800"/>
+            <a:ext cx="9144000" cy="457200"/>
+          </a:xfrm>
+          <a:prstGeom prst="rect">
+            <a:avLst/>
+          </a:prstGeom>
+          <a:gradFill flip="none" rotWithShape="1">
+            <a:gsLst>
+              <a:gs pos="0">
+                <a:srgbClr val="1F447F"/>
+              </a:gs>
+              <a:gs pos="50000">
+                <a:schemeClr val="accent1">
+                  <a:tint val="44500"/>
+                  <a:satMod val="160000"/>
+                </a:schemeClr>
+              </a:gs>
+              <a:gs pos="100000">
+                <a:schemeClr val="accent1">
+                  <a:tint val="23500"/>
+                  <a:satMod val="160000"/>
+                </a:schemeClr>
+              </a:gs>
+            </a:gsLst>
+            <a:lin ang="0" scaled="1"/>
+            <a:tileRect/>
+          </a:gradFill>
+          <a:ln>
+            <a:noFill/>
+          </a:ln>
+        </p:spPr>
+        <p:style>
+          <a:lnRef idx="2">
+            <a:schemeClr val="accent1">
+              <a:shade val="50000"/>
+            </a:schemeClr>
+          </a:lnRef>
+          <a:fillRef idx="1">
+            <a:schemeClr val="accent1"/>
+          </a:fillRef>
+          <a:effectRef idx="0">
+            <a:schemeClr val="accent1"/>
+          </a:effectRef>
+          <a:fontRef idx="minor">
+            <a:schemeClr val="lt1"/>
+          </a:fontRef>
+        </p:style>
+        <p:txBody>
+          <a:bodyPr lIns="91385" tIns="45693" rIns="91385" bIns="45693" anchor="ctr"/>
+          <a:lstStyle/>
+          <a:p>
+            <a:pPr algn="ctr">
+              <a:defRPr/>
+            </a:pPr>
+            <a:endParaRPr kumimoji="0" lang="en-US" dirty="0"/>
+          </a:p>
+        </p:txBody>
+      </p:sp>
+      <p:pic>
+        <p:nvPicPr>
           <p:cNvPr id="21509" name="Picture 11" descr="C:\Users\ccsloan\Dropbox\Senior Design\Presentations\Partner Day 2\UCSC logo (Transparent).tif"/>
           <p:cNvPicPr>
             <a:picLocks noChangeAspect="1" noChangeArrowheads="1"/>
@@ -5589,7 +6504,7 @@
 </p:sld>
 </file>
 
-<file path=ppt/slides/slide8.xml><?xml version="1.0" encoding="utf-8"?>
+<file path=ppt/slides/slide9.xml><?xml version="1.0" encoding="utf-8"?>
 <p:sld xmlns:a="http://schemas.openxmlformats.org/drawingml/2006/main" xmlns:r="http://schemas.openxmlformats.org/officeDocument/2006/relationships" xmlns:p="http://schemas.openxmlformats.org/presentationml/2006/main">
   <p:cSld>
     <p:spTree>
@@ -6114,4 +7029,265 @@
   <a:objectDefaults/>
   <a:extraClrSchemeLst/>
 </a:theme>
+</file>
+
+<file path=ppt/theme/theme2.xml><?xml version="1.0" encoding="utf-8"?>
+<a:theme xmlns:a="http://schemas.openxmlformats.org/drawingml/2006/main" name="Office Theme">
+  <a:themeElements>
+    <a:clrScheme name="Office">
+      <a:dk1>
+        <a:sysClr val="windowText" lastClr="000000"/>
+      </a:dk1>
+      <a:lt1>
+        <a:sysClr val="window" lastClr="FFFFFF"/>
+      </a:lt1>
+      <a:dk2>
+        <a:srgbClr val="44546A"/>
+      </a:dk2>
+      <a:lt2>
+        <a:srgbClr val="E7E6E6"/>
+      </a:lt2>
+      <a:accent1>
+        <a:srgbClr val="5B9BD5"/>
+      </a:accent1>
+      <a:accent2>
+        <a:srgbClr val="ED7D31"/>
+      </a:accent2>
+      <a:accent3>
+        <a:srgbClr val="A5A5A5"/>
+      </a:accent3>
+      <a:accent4>
+        <a:srgbClr val="FFC000"/>
+      </a:accent4>
+      <a:accent5>
+        <a:srgbClr val="4472C4"/>
+      </a:accent5>
+      <a:accent6>
+        <a:srgbClr val="70AD47"/>
+      </a:accent6>
+      <a:hlink>
+        <a:srgbClr val="0563C1"/>
+      </a:hlink>
+      <a:folHlink>
+        <a:srgbClr val="954F72"/>
+      </a:folHlink>
+    </a:clrScheme>
+    <a:fontScheme name="Office">
+      <a:majorFont>
+        <a:latin typeface="Calibri Light" panose="020F0302020204030204"/>
+        <a:ea typeface=""/>
+        <a:cs typeface=""/>
+        <a:font script="Jpan" typeface="ＭＳ Ｐゴシック"/>
+        <a:font script="Hang" typeface="맑은 고딕"/>
+        <a:font script="Hans" typeface="宋体"/>
+        <a:font script="Hant" typeface="新細明體"/>
+        <a:font script="Arab" typeface="Times New Roman"/>
+        <a:font script="Hebr" typeface="Times New Roman"/>
+        <a:font script="Thai" typeface="Angsana New"/>
+        <a:font script="Ethi" typeface="Nyala"/>
+        <a:font script="Beng" typeface="Vrinda"/>
+        <a:font script="Gujr" typeface="Shruti"/>
+        <a:font script="Khmr" typeface="MoolBoran"/>
+        <a:font script="Knda" typeface="Tunga"/>
+        <a:font script="Guru" typeface="Raavi"/>
+        <a:font script="Cans" typeface="Euphemia"/>
+        <a:font script="Cher" typeface="Plantagenet Cherokee"/>
+        <a:font script="Yiii" typeface="Microsoft Yi Baiti"/>
+        <a:font script="Tibt" typeface="Microsoft Himalaya"/>
+        <a:font script="Thaa" typeface="MV Boli"/>
+        <a:font script="Deva" typeface="Mangal"/>
+        <a:font script="Telu" typeface="Gautami"/>
+        <a:font script="Taml" typeface="Latha"/>
+        <a:font script="Syrc" typeface="Estrangelo Edessa"/>
+        <a:font script="Orya" typeface="Kalinga"/>
+        <a:font script="Mlym" typeface="Kartika"/>
+        <a:font script="Laoo" typeface="DokChampa"/>
+        <a:font script="Sinh" typeface="Iskoola Pota"/>
+        <a:font script="Mong" typeface="Mongolian Baiti"/>
+        <a:font script="Viet" typeface="Times New Roman"/>
+        <a:font script="Uigh" typeface="Microsoft Uighur"/>
+        <a:font script="Geor" typeface="Sylfaen"/>
+      </a:majorFont>
+      <a:minorFont>
+        <a:latin typeface="Calibri" panose="020F0502020204030204"/>
+        <a:ea typeface=""/>
+        <a:cs typeface=""/>
+        <a:font script="Jpan" typeface="ＭＳ Ｐゴシック"/>
+        <a:font script="Hang" typeface="맑은 고딕"/>
+        <a:font script="Hans" typeface="宋体"/>
+        <a:font script="Hant" typeface="新細明體"/>
+        <a:font script="Arab" typeface="Arial"/>
+        <a:font script="Hebr" typeface="Arial"/>
+        <a:font script="Thai" typeface="Cordia New"/>
+        <a:font script="Ethi" typeface="Nyala"/>
+        <a:font script="Beng" typeface="Vrinda"/>
+        <a:font script="Gujr" typeface="Shruti"/>
+        <a:font script="Khmr" typeface="DaunPenh"/>
+        <a:font script="Knda" typeface="Tunga"/>
+        <a:font script="Guru" typeface="Raavi"/>
+        <a:font script="Cans" typeface="Euphemia"/>
+        <a:font script="Cher" typeface="Plantagenet Cherokee"/>
+        <a:font script="Yiii" typeface="Microsoft Yi Baiti"/>
+        <a:font script="Tibt" typeface="Microsoft Himalaya"/>
+        <a:font script="Thaa" typeface="MV Boli"/>
+        <a:font script="Deva" typeface="Mangal"/>
+        <a:font script="Telu" typeface="Gautami"/>
+        <a:font script="Taml" typeface="Latha"/>
+        <a:font script="Syrc" typeface="Estrangelo Edessa"/>
+        <a:font script="Orya" typeface="Kalinga"/>
+        <a:font script="Mlym" typeface="Kartika"/>
+        <a:font script="Laoo" typeface="DokChampa"/>
+        <a:font script="Sinh" typeface="Iskoola Pota"/>
+        <a:font script="Mong" typeface="Mongolian Baiti"/>
+        <a:font script="Viet" typeface="Arial"/>
+        <a:font script="Uigh" typeface="Microsoft Uighur"/>
+        <a:font script="Geor" typeface="Sylfaen"/>
+      </a:minorFont>
+    </a:fontScheme>
+    <a:fmtScheme name="Office">
+      <a:fillStyleLst>
+        <a:solidFill>
+          <a:schemeClr val="phClr"/>
+        </a:solidFill>
+        <a:gradFill rotWithShape="1">
+          <a:gsLst>
+            <a:gs pos="0">
+              <a:schemeClr val="phClr">
+                <a:lumMod val="110000"/>
+                <a:satMod val="105000"/>
+                <a:tint val="67000"/>
+              </a:schemeClr>
+            </a:gs>
+            <a:gs pos="50000">
+              <a:schemeClr val="phClr">
+                <a:lumMod val="105000"/>
+                <a:satMod val="103000"/>
+                <a:tint val="73000"/>
+              </a:schemeClr>
+            </a:gs>
+            <a:gs pos="100000">
+              <a:schemeClr val="phClr">
+                <a:lumMod val="105000"/>
+                <a:satMod val="109000"/>
+                <a:tint val="81000"/>
+              </a:schemeClr>
+            </a:gs>
+          </a:gsLst>
+          <a:lin ang="5400000" scaled="0"/>
+        </a:gradFill>
+        <a:gradFill rotWithShape="1">
+          <a:gsLst>
+            <a:gs pos="0">
+              <a:schemeClr val="phClr">
+                <a:satMod val="103000"/>
+                <a:lumMod val="102000"/>
+                <a:tint val="94000"/>
+              </a:schemeClr>
+            </a:gs>
+            <a:gs pos="50000">
+              <a:schemeClr val="phClr">
+                <a:satMod val="110000"/>
+                <a:lumMod val="100000"/>
+                <a:shade val="100000"/>
+              </a:schemeClr>
+            </a:gs>
+            <a:gs pos="100000">
+              <a:schemeClr val="phClr">
+                <a:lumMod val="99000"/>
+                <a:satMod val="120000"/>
+                <a:shade val="78000"/>
+              </a:schemeClr>
+            </a:gs>
+          </a:gsLst>
+          <a:lin ang="5400000" scaled="0"/>
+        </a:gradFill>
+      </a:fillStyleLst>
+      <a:lnStyleLst>
+        <a:ln w="6350" cap="flat" cmpd="sng" algn="ctr">
+          <a:solidFill>
+            <a:schemeClr val="phClr"/>
+          </a:solidFill>
+          <a:prstDash val="solid"/>
+          <a:miter lim="800000"/>
+        </a:ln>
+        <a:ln w="12700" cap="flat" cmpd="sng" algn="ctr">
+          <a:solidFill>
+            <a:schemeClr val="phClr"/>
+          </a:solidFill>
+          <a:prstDash val="solid"/>
+          <a:miter lim="800000"/>
+        </a:ln>
+        <a:ln w="19050" cap="flat" cmpd="sng" algn="ctr">
+          <a:solidFill>
+            <a:schemeClr val="phClr"/>
+          </a:solidFill>
+          <a:prstDash val="solid"/>
+          <a:miter lim="800000"/>
+        </a:ln>
+      </a:lnStyleLst>
+      <a:effectStyleLst>
+        <a:effectStyle>
+          <a:effectLst/>
+        </a:effectStyle>
+        <a:effectStyle>
+          <a:effectLst/>
+        </a:effectStyle>
+        <a:effectStyle>
+          <a:effectLst>
+            <a:outerShdw blurRad="57150" dist="19050" dir="5400000" algn="ctr" rotWithShape="0">
+              <a:srgbClr val="000000">
+                <a:alpha val="63000"/>
+              </a:srgbClr>
+            </a:outerShdw>
+          </a:effectLst>
+        </a:effectStyle>
+      </a:effectStyleLst>
+      <a:bgFillStyleLst>
+        <a:solidFill>
+          <a:schemeClr val="phClr"/>
+        </a:solidFill>
+        <a:solidFill>
+          <a:schemeClr val="phClr">
+            <a:tint val="95000"/>
+            <a:satMod val="170000"/>
+          </a:schemeClr>
+        </a:solidFill>
+        <a:gradFill rotWithShape="1">
+          <a:gsLst>
+            <a:gs pos="0">
+              <a:schemeClr val="phClr">
+                <a:tint val="93000"/>
+                <a:satMod val="150000"/>
+                <a:shade val="98000"/>
+                <a:lumMod val="102000"/>
+              </a:schemeClr>
+            </a:gs>
+            <a:gs pos="50000">
+              <a:schemeClr val="phClr">
+                <a:tint val="98000"/>
+                <a:satMod val="130000"/>
+                <a:shade val="90000"/>
+                <a:lumMod val="103000"/>
+              </a:schemeClr>
+            </a:gs>
+            <a:gs pos="100000">
+              <a:schemeClr val="phClr">
+                <a:shade val="63000"/>
+                <a:satMod val="120000"/>
+              </a:schemeClr>
+            </a:gs>
+          </a:gsLst>
+          <a:lin ang="5400000" scaled="0"/>
+        </a:gradFill>
+      </a:bgFillStyleLst>
+    </a:fmtScheme>
+  </a:themeElements>
+  <a:objectDefaults/>
+  <a:extraClrSchemeLst/>
+  <a:extLst>
+    <a:ext uri="{05A4C25C-085E-4340-85A3-A5531E510DB2}">
+      <thm15:themeFamily xmlns:thm15="http://schemas.microsoft.com/office/thememl/2012/main" name="Office Theme" id="{62F939B6-93AF-4DB8-9C6B-D6C7DFDC589F}" vid="{4A3C46E8-61CC-4603-A589-7422A47A8E4A}"/>
+    </a:ext>
+  </a:extLst>
+</a:theme>
 </file>
</xml_diff>